<commit_message>
fix leftovers in slides
</commit_message>
<xml_diff>
--- a/Literatuurstudie/Literatuurstudie_ppt_new.pptx
+++ b/Literatuurstudie/Literatuurstudie_ppt_new.pptx
@@ -231,7 +231,7 @@
           <a:p>
             <a:fld id="{8F591CCF-F6FD-734B-854A-5BC033593B1E}" type="datetimeFigureOut">
               <a:rPr lang="nl-NL" smtClean="0"/>
-              <a:t>11-11-2020</a:t>
+              <a:t>12-11-2020</a:t>
             </a:fld>
             <a:endParaRPr lang="nl-NL"/>
           </a:p>
@@ -396,7 +396,7 @@
           <a:p>
             <a:fld id="{23C66214-DB21-4647-B5DA-0D17CA592867}" type="datetimeFigureOut">
               <a:rPr lang="nl-NL" smtClean="0"/>
-              <a:t>11-11-2020</a:t>
+              <a:t>12-11-2020</a:t>
             </a:fld>
             <a:endParaRPr lang="nl-NL"/>
           </a:p>
@@ -1385,7 +1385,7 @@
           <a:p>
             <a:fld id="{AC3C5412-F5E6-4727-B44A-B2B5A84DB14A}" type="datetime1">
               <a:rPr lang="nl-BE" smtClean="0"/>
-              <a:t>11/11/2020</a:t>
+              <a:t>12/11/2020</a:t>
             </a:fld>
             <a:endParaRPr lang="nl-NL"/>
           </a:p>
@@ -1668,7 +1668,7 @@
           <a:p>
             <a:fld id="{E76EA1B4-471F-4916-AE0F-2FD9B1494989}" type="datetime1">
               <a:rPr lang="nl-BE" smtClean="0"/>
-              <a:t>11/11/2020</a:t>
+              <a:t>12/11/2020</a:t>
             </a:fld>
             <a:endParaRPr lang="nl-NL"/>
           </a:p>
@@ -1998,7 +1998,7 @@
           <a:p>
             <a:fld id="{0FDEE988-C9D1-4B41-906C-78E5525EC368}" type="datetime1">
               <a:rPr lang="nl-BE" smtClean="0"/>
-              <a:t>11/11/2020</a:t>
+              <a:t>12/11/2020</a:t>
             </a:fld>
             <a:endParaRPr lang="nl-NL"/>
           </a:p>
@@ -2317,7 +2317,7 @@
           <a:p>
             <a:fld id="{A4C630F9-6046-48DD-8107-A903A5265F2A}" type="datetime1">
               <a:rPr lang="nl-BE" smtClean="0"/>
-              <a:t>11/11/2020</a:t>
+              <a:t>12/11/2020</a:t>
             </a:fld>
             <a:endParaRPr lang="nl-NL" dirty="0"/>
           </a:p>
@@ -2638,7 +2638,7 @@
           <a:p>
             <a:fld id="{AB142135-2AF6-41F5-9559-B5C94669121A}" type="datetime1">
               <a:rPr lang="nl-BE" smtClean="0"/>
-              <a:t>11/11/2020</a:t>
+              <a:t>12/11/2020</a:t>
             </a:fld>
             <a:endParaRPr lang="nl-NL" dirty="0"/>
           </a:p>
@@ -2780,7 +2780,7 @@
           <a:p>
             <a:fld id="{D7817D78-F253-471B-BF0C-B3EA74829726}" type="datetime1">
               <a:rPr lang="nl-BE" smtClean="0"/>
-              <a:t>11/11/2020</a:t>
+              <a:t>12/11/2020</a:t>
             </a:fld>
             <a:endParaRPr lang="nl-NL"/>
           </a:p>
@@ -3264,7 +3264,7 @@
           <a:p>
             <a:fld id="{94374391-CFDB-4833-B504-DEFBE92512D1}" type="datetime1">
               <a:rPr lang="nl-BE" smtClean="0"/>
-              <a:t>11/11/2020</a:t>
+              <a:t>12/11/2020</a:t>
             </a:fld>
             <a:endParaRPr lang="nl-NL" dirty="0"/>
           </a:p>
@@ -3385,7 +3385,7 @@
           <a:p>
             <a:fld id="{D41C31F0-2B75-48AE-AEBC-9657DD1B0AB7}" type="datetime1">
               <a:rPr lang="nl-BE" smtClean="0"/>
-              <a:t>11/11/2020</a:t>
+              <a:t>12/11/2020</a:t>
             </a:fld>
             <a:endParaRPr lang="nl-NL"/>
           </a:p>
@@ -3506,7 +3506,7 @@
           <a:p>
             <a:fld id="{53F19495-32E9-486F-877E-DF8DCF8228E7}" type="datetime1">
               <a:rPr lang="nl-BE" smtClean="0"/>
-              <a:t>11/11/2020</a:t>
+              <a:t>12/11/2020</a:t>
             </a:fld>
             <a:endParaRPr lang="nl-NL"/>
           </a:p>
@@ -3688,7 +3688,7 @@
           <a:p>
             <a:fld id="{804A002D-00A0-4BF6-93D8-8D999BC8C748}" type="datetime1">
               <a:rPr lang="nl-BE" smtClean="0"/>
-              <a:t>11/11/2020</a:t>
+              <a:t>12/11/2020</a:t>
             </a:fld>
             <a:endParaRPr lang="nl-NL" dirty="0"/>
           </a:p>
@@ -3972,7 +3972,7 @@
           <a:p>
             <a:fld id="{75FF7ED8-F103-41E3-857E-CDC769C97DAE}" type="datetime1">
               <a:rPr lang="nl-BE" smtClean="0"/>
-              <a:t>11/11/2020</a:t>
+              <a:t>12/11/2020</a:t>
             </a:fld>
             <a:endParaRPr lang="nl-NL" dirty="0"/>
           </a:p>
@@ -4613,7 +4613,7 @@
           <a:p>
             <a:fld id="{9F542F44-42ED-4221-90FD-ACE0C331DBA2}" type="datetime1">
               <a:rPr lang="nl-BE" smtClean="0"/>
-              <a:t>11/11/2020</a:t>
+              <a:t>12/11/2020</a:t>
             </a:fld>
             <a:endParaRPr lang="nl-NL" dirty="0"/>
           </a:p>
@@ -7691,7 +7691,7 @@
             </a:r>
             <a:r>
               <a:rPr lang="nl-BE" dirty="0" err="1"/>
-              <a:t>bayesian</a:t>
+              <a:t>Bayesian</a:t>
             </a:r>
             <a:r>
               <a:rPr lang="nl-BE" dirty="0"/>
@@ -10391,8 +10391,8 @@
           <a:chExt cx="0" cy="0"/>
         </a:xfrm>
       </p:grpSpPr>
-      <mc:AlternateContent xmlns:mc="http://schemas.openxmlformats.org/markup-compatibility/2006" xmlns:a14="http://schemas.microsoft.com/office/drawing/2010/main">
-        <mc:Choice Requires="a14">
+      <mc:AlternateContent xmlns:mc="http://schemas.openxmlformats.org/markup-compatibility/2006">
+        <mc:Choice xmlns:a14="http://schemas.microsoft.com/office/drawing/2010/main" Requires="a14">
           <p:sp>
             <p:nvSpPr>
               <p:cNvPr id="2" name="Tijdelijke aanduiding voor inhoud 1">
@@ -10429,30 +10429,6 @@
                 <a:r>
                   <a:rPr lang="nl-BE" dirty="0"/>
                   <a:t>Verwachte output vergelijken met netwerkoutput </a:t>
-                </a:r>
-                <a:r>
-                  <a:rPr lang="nl-BE" dirty="0">
-                    <a:highlight>
-                      <a:srgbClr val="FFFF00"/>
-                    </a:highlight>
-                  </a:rPr>
-                  <a:t>(</a:t>
-                </a:r>
-                <a:r>
-                  <a:rPr lang="nl-BE" dirty="0" err="1">
-                    <a:highlight>
-                      <a:srgbClr val="FFFF00"/>
-                    </a:highlight>
-                  </a:rPr>
-                  <a:t>tmp</a:t>
-                </a:r>
-                <a:r>
-                  <a:rPr lang="nl-BE" dirty="0">
-                    <a:highlight>
-                      <a:srgbClr val="FFFF00"/>
-                    </a:highlight>
-                  </a:rPr>
-                  <a:t>: trainingsdataset)</a:t>
                 </a:r>
               </a:p>
               <a:p>
@@ -10643,7 +10619,7 @@
             </p:txBody>
           </p:sp>
         </mc:Choice>
-        <mc:Fallback xmlns="">
+        <mc:Fallback>
           <p:sp>
             <p:nvSpPr>
               <p:cNvPr id="2" name="Tijdelijke aanduiding voor inhoud 1">
@@ -11065,7 +11041,7 @@
                 <a14:m>
                   <m:oMath xmlns:m="http://schemas.openxmlformats.org/officeDocument/2006/math">
                     <m:r>
-                      <a:rPr lang="nl-BE" i="1">
+                      <a:rPr lang="nl-BE" i="1" smtClean="0">
                         <a:latin typeface="Cambria Math" panose="02040503050406030204" pitchFamily="18" charset="0"/>
                       </a:rPr>
                       <m:t>−</m:t>
@@ -11853,8 +11829,8 @@
           <a:chExt cx="0" cy="0"/>
         </a:xfrm>
       </p:grpSpPr>
-      <mc:AlternateContent xmlns:mc="http://schemas.openxmlformats.org/markup-compatibility/2006">
-        <mc:Choice xmlns:a14="http://schemas.microsoft.com/office/drawing/2010/main" Requires="a14">
+      <mc:AlternateContent xmlns:mc="http://schemas.openxmlformats.org/markup-compatibility/2006" xmlns:a14="http://schemas.microsoft.com/office/drawing/2010/main">
+        <mc:Choice Requires="a14">
           <p:sp>
             <p:nvSpPr>
               <p:cNvPr id="2" name="Tijdelijke aanduiding voor inhoud 1">
@@ -12040,7 +12016,7 @@
             </p:txBody>
           </p:sp>
         </mc:Choice>
-        <mc:Fallback>
+        <mc:Fallback xmlns="">
           <p:sp>
             <p:nvSpPr>
               <p:cNvPr id="2" name="Tijdelijke aanduiding voor inhoud 1">
@@ -12189,7 +12165,7 @@
           <p:nvPr/>
         </p:nvPicPr>
         <p:blipFill>
-          <a:blip r:embed="rId3"/>
+          <a:blip r:embed="rId2"/>
           <a:stretch>
             <a:fillRect/>
           </a:stretch>
@@ -12258,7 +12234,7 @@
           <p:nvPr/>
         </p:nvPicPr>
         <p:blipFill rotWithShape="1">
-          <a:blip r:embed="rId4">
+          <a:blip r:embed="rId3">
             <a:extLst>
               <a:ext uri="{28A0092B-C50C-407E-A947-70E740481C1C}">
                 <a14:useLocalDpi xmlns:a14="http://schemas.microsoft.com/office/drawing/2010/main" val="0"/>
@@ -12303,7 +12279,7 @@
           <p:nvPr/>
         </p:nvPicPr>
         <p:blipFill>
-          <a:blip r:embed="rId5"/>
+          <a:blip r:embed="rId4"/>
           <a:stretch>
             <a:fillRect/>
           </a:stretch>

</xml_diff>

<commit_message>
Aantal schoonheids aanpassingen gemaakt.
</commit_message>
<xml_diff>
--- a/Literatuurstudie/Literatuurstudie_ppt_new.pptx
+++ b/Literatuurstudie/Literatuurstudie_ppt_new.pptx
@@ -297,7 +297,7 @@
           <a:p>
             <a:fld id="{E152A6D4-CD3D-5148-8B70-A84796F20135}" type="slidenum">
               <a:rPr lang="nl-NL" smtClean="0"/>
-              <a:t>‹nr.›</a:t>
+              <a:t>‹#›</a:t>
             </a:fld>
             <a:endParaRPr lang="nl-NL"/>
           </a:p>
@@ -554,7 +554,7 @@
           <a:p>
             <a:fld id="{8954E32A-327F-AF4B-8E1F-209FBF93D26D}" type="slidenum">
               <a:rPr lang="nl-NL" smtClean="0"/>
-              <a:t>‹nr.›</a:t>
+              <a:t>‹#›</a:t>
             </a:fld>
             <a:endParaRPr lang="nl-NL"/>
           </a:p>
@@ -1430,7 +1430,7 @@
           <a:p>
             <a:fld id="{CF179DAE-D0A6-40C3-B8BC-6A97C268D03A}" type="slidenum">
               <a:rPr lang="nl-NL" smtClean="0"/>
-              <a:t>‹nr.›</a:t>
+              <a:t>‹#›</a:t>
             </a:fld>
             <a:endParaRPr lang="nl-NL"/>
           </a:p>
@@ -1713,7 +1713,7 @@
           <a:p>
             <a:fld id="{CF179DAE-D0A6-40C3-B8BC-6A97C268D03A}" type="slidenum">
               <a:rPr lang="nl-NL" smtClean="0"/>
-              <a:t>‹nr.›</a:t>
+              <a:t>‹#›</a:t>
             </a:fld>
             <a:endParaRPr lang="nl-NL"/>
           </a:p>
@@ -2043,7 +2043,7 @@
           <a:p>
             <a:fld id="{0A297500-7527-634B-90F4-69D0994C32B4}" type="slidenum">
               <a:rPr lang="nl-NL" smtClean="0"/>
-              <a:t>‹nr.›</a:t>
+              <a:t>‹#›</a:t>
             </a:fld>
             <a:endParaRPr lang="nl-NL"/>
           </a:p>
@@ -2362,7 +2362,7 @@
           <a:p>
             <a:fld id="{0A297500-7527-634B-90F4-69D0994C32B4}" type="slidenum">
               <a:rPr lang="nl-NL" smtClean="0"/>
-              <a:t>‹nr.›</a:t>
+              <a:t>‹#›</a:t>
             </a:fld>
             <a:endParaRPr lang="nl-NL"/>
           </a:p>
@@ -2683,7 +2683,7 @@
           <a:p>
             <a:fld id="{0A297500-7527-634B-90F4-69D0994C32B4}" type="slidenum">
               <a:rPr lang="nl-NL" smtClean="0"/>
-              <a:t>‹nr.›</a:t>
+              <a:t>‹#›</a:t>
             </a:fld>
             <a:endParaRPr lang="nl-NL"/>
           </a:p>
@@ -2825,7 +2825,7 @@
           <a:p>
             <a:fld id="{0A297500-7527-634B-90F4-69D0994C32B4}" type="slidenum">
               <a:rPr lang="nl-NL" smtClean="0"/>
-              <a:t>‹nr.›</a:t>
+              <a:t>‹#›</a:t>
             </a:fld>
             <a:endParaRPr lang="nl-NL"/>
           </a:p>
@@ -3309,7 +3309,7 @@
           <a:p>
             <a:fld id="{0A297500-7527-634B-90F4-69D0994C32B4}" type="slidenum">
               <a:rPr lang="nl-NL" smtClean="0"/>
-              <a:t>‹nr.›</a:t>
+              <a:t>‹#›</a:t>
             </a:fld>
             <a:endParaRPr lang="nl-NL"/>
           </a:p>
@@ -3430,7 +3430,7 @@
           <a:p>
             <a:fld id="{0A297500-7527-634B-90F4-69D0994C32B4}" type="slidenum">
               <a:rPr lang="nl-NL" smtClean="0"/>
-              <a:t>‹nr.›</a:t>
+              <a:t>‹#›</a:t>
             </a:fld>
             <a:endParaRPr lang="nl-NL"/>
           </a:p>
@@ -3551,7 +3551,7 @@
           <a:p>
             <a:fld id="{0A297500-7527-634B-90F4-69D0994C32B4}" type="slidenum">
               <a:rPr lang="nl-NL" smtClean="0"/>
-              <a:t>‹nr.›</a:t>
+              <a:t>‹#›</a:t>
             </a:fld>
             <a:endParaRPr lang="nl-NL"/>
           </a:p>
@@ -3733,7 +3733,7 @@
           <a:p>
             <a:fld id="{0A297500-7527-634B-90F4-69D0994C32B4}" type="slidenum">
               <a:rPr lang="nl-NL" smtClean="0"/>
-              <a:t>‹nr.›</a:t>
+              <a:t>‹#›</a:t>
             </a:fld>
             <a:endParaRPr lang="nl-NL"/>
           </a:p>
@@ -4053,7 +4053,7 @@
             <a:fld id="{0A297500-7527-634B-90F4-69D0994C32B4}" type="slidenum">
               <a:rPr lang="nl-NL" smtClean="0"/>
               <a:pPr/>
-              <a:t>‹nr.›</a:t>
+              <a:t>‹#›</a:t>
             </a:fld>
             <a:endParaRPr lang="nl-NL" dirty="0"/>
           </a:p>
@@ -4694,7 +4694,7 @@
             <a:fld id="{0A297500-7527-634B-90F4-69D0994C32B4}" type="slidenum">
               <a:rPr lang="nl-NL" smtClean="0"/>
               <a:pPr/>
-              <a:t>‹nr.›</a:t>
+              <a:t>‹#›</a:t>
             </a:fld>
             <a:endParaRPr lang="nl-NL" dirty="0"/>
           </a:p>
@@ -6638,7 +6638,7 @@
         </p:nvSpPr>
         <p:spPr>
           <a:xfrm>
-            <a:off x="9290553" y="4380584"/>
+            <a:off x="9290553" y="4398174"/>
             <a:ext cx="1563204" cy="381321"/>
           </a:xfrm>
           <a:prstGeom prst="rect">
@@ -9045,7 +9045,7 @@
         </p:nvSpPr>
         <p:spPr>
           <a:xfrm>
-            <a:off x="5948888" y="1582111"/>
+            <a:off x="5908248" y="1582111"/>
             <a:ext cx="680936" cy="2907414"/>
           </a:xfrm>
           <a:prstGeom prst="rect">
@@ -9322,7 +9322,7 @@
         </p:nvCxnSpPr>
         <p:spPr>
           <a:xfrm>
-            <a:off x="6289356" y="4489525"/>
+            <a:off x="6248716" y="4489525"/>
             <a:ext cx="1" cy="274605"/>
           </a:xfrm>
           <a:prstGeom prst="straightConnector1">
@@ -10391,8 +10391,8 @@
           <a:chExt cx="0" cy="0"/>
         </a:xfrm>
       </p:grpSpPr>
-      <mc:AlternateContent xmlns:mc="http://schemas.openxmlformats.org/markup-compatibility/2006" xmlns:a14="http://schemas.microsoft.com/office/drawing/2010/main">
-        <mc:Choice Requires="a14">
+      <mc:AlternateContent xmlns:mc="http://schemas.openxmlformats.org/markup-compatibility/2006">
+        <mc:Choice xmlns:a14="http://schemas.microsoft.com/office/drawing/2010/main" Requires="a14">
           <p:sp>
             <p:nvSpPr>
               <p:cNvPr id="2" name="Tijdelijke aanduiding voor inhoud 1">
@@ -10596,30 +10596,12 @@
                     </m:r>
                   </m:oMath>
                 </a14:m>
-                <a:r>
-                  <a:rPr lang="nl-BE" dirty="0"/>
-                  <a:t>, </a:t>
-                </a:r>
-                <a14:m>
-                  <m:oMath xmlns:m="http://schemas.openxmlformats.org/officeDocument/2006/math">
-                    <m:r>
-                      <a:rPr lang="nl-BE" i="1">
-                        <a:latin typeface="Cambria Math" panose="02040503050406030204" pitchFamily="18" charset="0"/>
-                        <a:ea typeface="Cambria Math" panose="02040503050406030204" pitchFamily="18" charset="0"/>
-                      </a:rPr>
-                      <m:t>𝛼</m:t>
-                    </m:r>
-                  </m:oMath>
-                </a14:m>
-                <a:r>
-                  <a:rPr lang="nl-BE" dirty="0"/>
-                  <a:t> = stap-grootte</a:t>
-                </a:r>
+                <a:endParaRPr lang="nl-BE" dirty="0"/>
               </a:p>
             </p:txBody>
           </p:sp>
         </mc:Choice>
-        <mc:Fallback xmlns="">
+        <mc:Fallback>
           <p:sp>
             <p:nvSpPr>
               <p:cNvPr id="2" name="Tijdelijke aanduiding voor inhoud 1">
@@ -10653,7 +10635,7 @@
               <a:lstStyle/>
               <a:p>
                 <a:r>
-                  <a:rPr lang="nl-BE">
+                  <a:rPr lang="en-GB">
                     <a:noFill/>
                   </a:rPr>
                   <a:t> </a:t>
@@ -10830,8 +10812,8 @@
           <a:chExt cx="0" cy="0"/>
         </a:xfrm>
       </p:grpSpPr>
-      <mc:AlternateContent xmlns:mc="http://schemas.openxmlformats.org/markup-compatibility/2006" xmlns:a14="http://schemas.microsoft.com/office/drawing/2010/main">
-        <mc:Choice Requires="a14">
+      <mc:AlternateContent xmlns:mc="http://schemas.openxmlformats.org/markup-compatibility/2006">
+        <mc:Choice xmlns:a14="http://schemas.microsoft.com/office/drawing/2010/main" Requires="a14">
           <p:sp>
             <p:nvSpPr>
               <p:cNvPr id="2" name="Tijdelijke aanduiding voor inhoud 1">
@@ -11030,14 +11012,6 @@
                 </a:endParaRPr>
               </a:p>
               <a:p>
-                <a:pPr marL="457200" lvl="1" indent="0">
-                  <a:buNone/>
-                </a:pPr>
-                <a:endParaRPr lang="nl-BE" i="1" dirty="0">
-                  <a:latin typeface="Cambria Math" panose="02040503050406030204" pitchFamily="18" charset="0"/>
-                </a:endParaRPr>
-              </a:p>
-              <a:p>
                 <a14:m>
                   <m:oMath xmlns:m="http://schemas.openxmlformats.org/officeDocument/2006/math">
                     <m:r>
@@ -11136,7 +11110,7 @@
             </p:txBody>
           </p:sp>
         </mc:Choice>
-        <mc:Fallback xmlns="">
+        <mc:Fallback>
           <p:sp>
             <p:nvSpPr>
               <p:cNvPr id="2" name="Tijdelijke aanduiding voor inhoud 1">
@@ -11170,7 +11144,7 @@
               <a:lstStyle/>
               <a:p>
                 <a:r>
-                  <a:rPr lang="nl-BE">
+                  <a:rPr lang="en-GB">
                     <a:noFill/>
                   </a:rPr>
                   <a:t> </a:t>
@@ -11365,16 +11339,15 @@
             <p:ph idx="1"/>
           </p:nvPr>
         </p:nvPicPr>
-        <p:blipFill>
+        <p:blipFill rotWithShape="1">
           <a:blip r:embed="rId2"/>
-          <a:stretch>
-            <a:fillRect/>
-          </a:stretch>
+          <a:srcRect l="2528"/>
+          <a:stretch/>
         </p:blipFill>
         <p:spPr>
           <a:xfrm>
-            <a:off x="4387537" y="1359036"/>
-            <a:ext cx="4282811" cy="876376"/>
+            <a:off x="4395157" y="1371736"/>
+            <a:ext cx="4174548" cy="876376"/>
           </a:xfrm>
         </p:spPr>
       </p:pic>
@@ -11481,16 +11454,15 @@
           </p:cNvPicPr>
           <p:nvPr/>
         </p:nvPicPr>
-        <p:blipFill>
+        <p:blipFill rotWithShape="1">
           <a:blip r:embed="rId3"/>
-          <a:stretch>
-            <a:fillRect/>
-          </a:stretch>
+          <a:srcRect l="1550"/>
+          <a:stretch/>
         </p:blipFill>
         <p:spPr>
           <a:xfrm>
-            <a:off x="4387537" y="4518507"/>
-            <a:ext cx="3543607" cy="533446"/>
+            <a:off x="4387537" y="4543907"/>
+            <a:ext cx="3488684" cy="533446"/>
           </a:xfrm>
           <a:prstGeom prst="rect">
             <a:avLst/>
@@ -11511,16 +11483,15 @@
           </p:cNvPicPr>
           <p:nvPr/>
         </p:nvPicPr>
-        <p:blipFill>
+        <p:blipFill rotWithShape="1">
           <a:blip r:embed="rId4"/>
-          <a:stretch>
-            <a:fillRect/>
-          </a:stretch>
+          <a:srcRect l="3057" r="-1"/>
+          <a:stretch/>
         </p:blipFill>
         <p:spPr>
           <a:xfrm>
-            <a:off x="4387537" y="5326727"/>
-            <a:ext cx="3292125" cy="838273"/>
+            <a:off x="4387537" y="5281727"/>
+            <a:ext cx="3191482" cy="838273"/>
           </a:xfrm>
           <a:prstGeom prst="rect">
             <a:avLst/>
@@ -12256,7 +12227,7 @@
         </p:blipFill>
         <p:spPr>
           <a:xfrm>
-            <a:off x="6974437" y="1669039"/>
+            <a:off x="6974437" y="1665256"/>
             <a:ext cx="1259832" cy="430378"/>
           </a:xfrm>
           <a:prstGeom prst="rect">
@@ -12505,16 +12476,15 @@
           </p:cNvPicPr>
           <p:nvPr/>
         </p:nvPicPr>
-        <p:blipFill>
+        <p:blipFill rotWithShape="1">
           <a:blip r:embed="rId2"/>
-          <a:stretch>
-            <a:fillRect/>
-          </a:stretch>
+          <a:srcRect l="3639" t="9482"/>
+          <a:stretch/>
         </p:blipFill>
         <p:spPr>
           <a:xfrm>
-            <a:off x="6598362" y="1505304"/>
-            <a:ext cx="2827265" cy="640135"/>
+            <a:off x="6598362" y="1566000"/>
+            <a:ext cx="2724381" cy="579439"/>
           </a:xfrm>
           <a:prstGeom prst="rect">
             <a:avLst/>
@@ -12535,16 +12505,15 @@
           </p:cNvPicPr>
           <p:nvPr/>
         </p:nvPicPr>
-        <p:blipFill>
+        <p:blipFill rotWithShape="1">
           <a:blip r:embed="rId3"/>
-          <a:stretch>
-            <a:fillRect/>
-          </a:stretch>
+          <a:srcRect l="1913"/>
+          <a:stretch/>
         </p:blipFill>
         <p:spPr>
           <a:xfrm>
             <a:off x="6598362" y="2813005"/>
-            <a:ext cx="3863675" cy="1005927"/>
+            <a:ext cx="3789774" cy="1005927"/>
           </a:xfrm>
           <a:prstGeom prst="rect">
             <a:avLst/>

</xml_diff>

<commit_message>
animatie opgedeeld in 2 voor pdf formaat.
</commit_message>
<xml_diff>
--- a/Literatuurstudie/Literatuurstudie_ppt_new.pptx
+++ b/Literatuurstudie/Literatuurstudie_ppt_new.pptx
@@ -6,30 +6,31 @@
     <p:sldMasterId id="2147483694" r:id="rId2"/>
   </p:sldMasterIdLst>
   <p:notesMasterIdLst>
-    <p:notesMasterId r:id="rId21"/>
+    <p:notesMasterId r:id="rId22"/>
   </p:notesMasterIdLst>
   <p:handoutMasterIdLst>
-    <p:handoutMasterId r:id="rId22"/>
+    <p:handoutMasterId r:id="rId23"/>
   </p:handoutMasterIdLst>
   <p:sldIdLst>
     <p:sldId id="261" r:id="rId3"/>
     <p:sldId id="268" r:id="rId4"/>
     <p:sldId id="291" r:id="rId5"/>
     <p:sldId id="284" r:id="rId6"/>
-    <p:sldId id="271" r:id="rId7"/>
-    <p:sldId id="290" r:id="rId8"/>
-    <p:sldId id="279" r:id="rId9"/>
-    <p:sldId id="281" r:id="rId10"/>
-    <p:sldId id="282" r:id="rId11"/>
-    <p:sldId id="292" r:id="rId12"/>
-    <p:sldId id="278" r:id="rId13"/>
-    <p:sldId id="275" r:id="rId14"/>
-    <p:sldId id="276" r:id="rId15"/>
-    <p:sldId id="272" r:id="rId16"/>
-    <p:sldId id="273" r:id="rId17"/>
-    <p:sldId id="274" r:id="rId18"/>
-    <p:sldId id="287" r:id="rId19"/>
-    <p:sldId id="285" r:id="rId20"/>
+    <p:sldId id="293" r:id="rId7"/>
+    <p:sldId id="271" r:id="rId8"/>
+    <p:sldId id="290" r:id="rId9"/>
+    <p:sldId id="279" r:id="rId10"/>
+    <p:sldId id="281" r:id="rId11"/>
+    <p:sldId id="282" r:id="rId12"/>
+    <p:sldId id="292" r:id="rId13"/>
+    <p:sldId id="278" r:id="rId14"/>
+    <p:sldId id="275" r:id="rId15"/>
+    <p:sldId id="276" r:id="rId16"/>
+    <p:sldId id="272" r:id="rId17"/>
+    <p:sldId id="273" r:id="rId18"/>
+    <p:sldId id="274" r:id="rId19"/>
+    <p:sldId id="287" r:id="rId20"/>
+    <p:sldId id="285" r:id="rId21"/>
   </p:sldIdLst>
   <p:sldSz cx="12192000" cy="6858000"/>
   <p:notesSz cx="6858000" cy="9144000"/>
@@ -5147,7 +5148,7 @@
           <p:cNvPr id="2" name="Tijdelijke aanduiding voor inhoud 1">
             <a:extLst>
               <a:ext uri="{FF2B5EF4-FFF2-40B4-BE49-F238E27FC236}">
-                <a16:creationId xmlns:a16="http://schemas.microsoft.com/office/drawing/2014/main" id="{7B15AAC3-EC85-45D1-8E9F-E8A82D0022B9}"/>
+                <a16:creationId xmlns:a16="http://schemas.microsoft.com/office/drawing/2014/main" id="{C79333D8-4E56-48D2-8BC5-D836CD92E7F5}"/>
               </a:ext>
             </a:extLst>
           </p:cNvPr>
@@ -5165,36 +5166,44 @@
           <a:p>
             <a:r>
               <a:rPr lang="nl-BE" dirty="0"/>
-              <a:t>Generaliseren = niet eerder geziene datapunten correct labelen</a:t>
-            </a:r>
-          </a:p>
-          <a:p>
-            <a:r>
-              <a:rPr lang="nl-BE" dirty="0"/>
-              <a:t>Doel van het netwerk: goed generaliseren</a:t>
-            </a:r>
-          </a:p>
-          <a:p>
-            <a:r>
-              <a:rPr lang="nl-BE" dirty="0"/>
-              <a:t>Kleine fout op </a:t>
-            </a:r>
-            <a:r>
-              <a:rPr lang="nl-BE" dirty="0" err="1"/>
-              <a:t>trainingsset</a:t>
-            </a:r>
-            <a:r>
-              <a:rPr lang="nl-BE" dirty="0"/>
-              <a:t> ≠ goede generalisatie</a:t>
+              <a:t>Telkens 1 punt nemen:</a:t>
             </a:r>
           </a:p>
           <a:p>
             <a:pPr marL="0" indent="0">
               <a:buNone/>
             </a:pPr>
+            <a:endParaRPr lang="nl-BE" dirty="0"/>
+          </a:p>
+          <a:p>
+            <a:pPr marL="0" indent="0">
+              <a:buNone/>
+            </a:pPr>
+            <a:endParaRPr lang="nl-BE" dirty="0"/>
+          </a:p>
+          <a:p>
             <a:r>
               <a:rPr lang="nl-BE" dirty="0"/>
-              <a:t>Voorbeeld:</a:t>
+              <a:t>Telkens m &lt;&lt; N punten nemen:</a:t>
+            </a:r>
+          </a:p>
+          <a:p>
+            <a:pPr lvl="1"/>
+            <a:r>
+              <a:rPr lang="nl-BE" dirty="0"/>
+              <a:t>Minibatch</a:t>
+            </a:r>
+          </a:p>
+          <a:p>
+            <a:endParaRPr lang="nl-BE" dirty="0"/>
+          </a:p>
+          <a:p>
+            <a:endParaRPr lang="nl-BE" dirty="0"/>
+          </a:p>
+          <a:p>
+            <a:r>
+              <a:rPr lang="nl-BE" dirty="0"/>
+              <a:t>Met/zonder vervanging</a:t>
             </a:r>
           </a:p>
         </p:txBody>
@@ -5204,7 +5213,7 @@
           <p:cNvPr id="3" name="Tijdelijke aanduiding voor voettekst 2">
             <a:extLst>
               <a:ext uri="{FF2B5EF4-FFF2-40B4-BE49-F238E27FC236}">
-                <a16:creationId xmlns:a16="http://schemas.microsoft.com/office/drawing/2014/main" id="{E8A64DED-D2C6-4420-BC5B-2AC9205393A1}"/>
+                <a16:creationId xmlns:a16="http://schemas.microsoft.com/office/drawing/2014/main" id="{70CB2AD9-04AF-4EA4-BA1E-3377F6E0748D}"/>
               </a:ext>
             </a:extLst>
           </p:cNvPr>
@@ -5232,7 +5241,7 @@
           <p:cNvPr id="4" name="Tijdelijke aanduiding voor dianummer 3">
             <a:extLst>
               <a:ext uri="{FF2B5EF4-FFF2-40B4-BE49-F238E27FC236}">
-                <a16:creationId xmlns:a16="http://schemas.microsoft.com/office/drawing/2014/main" id="{7F0A9854-7366-4EB1-A83C-310994DA9FAD}"/>
+                <a16:creationId xmlns:a16="http://schemas.microsoft.com/office/drawing/2014/main" id="{86C94A12-C2C6-4355-AAC4-5D2C3F4A327F}"/>
               </a:ext>
             </a:extLst>
           </p:cNvPr>
@@ -5251,6 +5260,253 @@
             <a:fld id="{0A297500-7527-634B-90F4-69D0994C32B4}" type="slidenum">
               <a:rPr lang="nl-NL" smtClean="0"/>
               <a:t>10</a:t>
+            </a:fld>
+            <a:endParaRPr lang="nl-NL"/>
+          </a:p>
+        </p:txBody>
+      </p:sp>
+      <p:sp>
+        <p:nvSpPr>
+          <p:cNvPr id="5" name="Titel 4">
+            <a:extLst>
+              <a:ext uri="{FF2B5EF4-FFF2-40B4-BE49-F238E27FC236}">
+                <a16:creationId xmlns:a16="http://schemas.microsoft.com/office/drawing/2014/main" id="{8A8BAFB1-02E4-4847-A573-784E02115F7B}"/>
+              </a:ext>
+            </a:extLst>
+          </p:cNvPr>
+          <p:cNvSpPr>
+            <a:spLocks noGrp="1"/>
+          </p:cNvSpPr>
+          <p:nvPr>
+            <p:ph type="title"/>
+          </p:nvPr>
+        </p:nvSpPr>
+        <p:spPr/>
+        <p:txBody>
+          <a:bodyPr/>
+          <a:lstStyle/>
+          <a:p>
+            <a:r>
+              <a:rPr lang="nl-BE" dirty="0" err="1"/>
+              <a:t>Stochastic</a:t>
+            </a:r>
+            <a:r>
+              <a:rPr lang="nl-BE" dirty="0"/>
+              <a:t> </a:t>
+            </a:r>
+            <a:r>
+              <a:rPr lang="nl-BE" dirty="0" err="1"/>
+              <a:t>gradient</a:t>
+            </a:r>
+            <a:r>
+              <a:rPr lang="nl-BE" dirty="0"/>
+              <a:t> </a:t>
+            </a:r>
+            <a:r>
+              <a:rPr lang="nl-BE" dirty="0" err="1"/>
+              <a:t>descent</a:t>
+            </a:r>
+            <a:endParaRPr lang="nl-BE" dirty="0"/>
+          </a:p>
+        </p:txBody>
+      </p:sp>
+      <p:pic>
+        <p:nvPicPr>
+          <p:cNvPr id="7" name="Afbeelding 6" descr="Afbeelding met object, klok&#10;&#10;Automatisch gegenereerde beschrijving">
+            <a:extLst>
+              <a:ext uri="{FF2B5EF4-FFF2-40B4-BE49-F238E27FC236}">
+                <a16:creationId xmlns:a16="http://schemas.microsoft.com/office/drawing/2014/main" id="{1499888D-4D2D-48AA-822E-E73E59823143}"/>
+              </a:ext>
+            </a:extLst>
+          </p:cNvPr>
+          <p:cNvPicPr>
+            <a:picLocks noChangeAspect="1"/>
+          </p:cNvPicPr>
+          <p:nvPr/>
+        </p:nvPicPr>
+        <p:blipFill rotWithShape="1">
+          <a:blip r:embed="rId2"/>
+          <a:srcRect l="3639" t="9482"/>
+          <a:stretch/>
+        </p:blipFill>
+        <p:spPr>
+          <a:xfrm>
+            <a:off x="6598362" y="1566000"/>
+            <a:ext cx="2724381" cy="579439"/>
+          </a:xfrm>
+          <a:prstGeom prst="rect">
+            <a:avLst/>
+          </a:prstGeom>
+        </p:spPr>
+      </p:pic>
+      <p:pic>
+        <p:nvPicPr>
+          <p:cNvPr id="9" name="Afbeelding 8" descr="Afbeelding met object, klok&#10;&#10;Automatisch gegenereerde beschrijving">
+            <a:extLst>
+              <a:ext uri="{FF2B5EF4-FFF2-40B4-BE49-F238E27FC236}">
+                <a16:creationId xmlns:a16="http://schemas.microsoft.com/office/drawing/2014/main" id="{7A770CCF-297A-49CB-A7AB-C9200BD735D8}"/>
+              </a:ext>
+            </a:extLst>
+          </p:cNvPr>
+          <p:cNvPicPr>
+            <a:picLocks noChangeAspect="1"/>
+          </p:cNvPicPr>
+          <p:nvPr/>
+        </p:nvPicPr>
+        <p:blipFill rotWithShape="1">
+          <a:blip r:embed="rId3"/>
+          <a:srcRect l="1913"/>
+          <a:stretch/>
+        </p:blipFill>
+        <p:spPr>
+          <a:xfrm>
+            <a:off x="6598362" y="2813005"/>
+            <a:ext cx="3789774" cy="1005927"/>
+          </a:xfrm>
+          <a:prstGeom prst="rect">
+            <a:avLst/>
+          </a:prstGeom>
+        </p:spPr>
+      </p:pic>
+    </p:spTree>
+    <p:extLst>
+      <p:ext uri="{BB962C8B-B14F-4D97-AF65-F5344CB8AC3E}">
+        <p14:creationId xmlns:p14="http://schemas.microsoft.com/office/powerpoint/2010/main" val="1225278259"/>
+      </p:ext>
+    </p:extLst>
+  </p:cSld>
+  <p:clrMapOvr>
+    <a:masterClrMapping/>
+  </p:clrMapOvr>
+</p:sld>
+</file>
+
+<file path=ppt/slides/slide11.xml><?xml version="1.0" encoding="utf-8"?>
+<p:sld xmlns:a="http://schemas.openxmlformats.org/drawingml/2006/main" xmlns:r="http://schemas.openxmlformats.org/officeDocument/2006/relationships" xmlns:p="http://schemas.openxmlformats.org/presentationml/2006/main">
+  <p:cSld>
+    <p:spTree>
+      <p:nvGrpSpPr>
+        <p:cNvPr id="1" name=""/>
+        <p:cNvGrpSpPr/>
+        <p:nvPr/>
+      </p:nvGrpSpPr>
+      <p:grpSpPr>
+        <a:xfrm>
+          <a:off x="0" y="0"/>
+          <a:ext cx="0" cy="0"/>
+          <a:chOff x="0" y="0"/>
+          <a:chExt cx="0" cy="0"/>
+        </a:xfrm>
+      </p:grpSpPr>
+      <p:sp>
+        <p:nvSpPr>
+          <p:cNvPr id="2" name="Tijdelijke aanduiding voor inhoud 1">
+            <a:extLst>
+              <a:ext uri="{FF2B5EF4-FFF2-40B4-BE49-F238E27FC236}">
+                <a16:creationId xmlns:a16="http://schemas.microsoft.com/office/drawing/2014/main" id="{7B15AAC3-EC85-45D1-8E9F-E8A82D0022B9}"/>
+              </a:ext>
+            </a:extLst>
+          </p:cNvPr>
+          <p:cNvSpPr>
+            <a:spLocks noGrp="1"/>
+          </p:cNvSpPr>
+          <p:nvPr>
+            <p:ph idx="1"/>
+          </p:nvPr>
+        </p:nvSpPr>
+        <p:spPr/>
+        <p:txBody>
+          <a:bodyPr/>
+          <a:lstStyle/>
+          <a:p>
+            <a:r>
+              <a:rPr lang="nl-BE" dirty="0"/>
+              <a:t>Generaliseren = niet eerder geziene datapunten correct labelen</a:t>
+            </a:r>
+          </a:p>
+          <a:p>
+            <a:r>
+              <a:rPr lang="nl-BE" dirty="0"/>
+              <a:t>Doel van het netwerk: goed generaliseren</a:t>
+            </a:r>
+          </a:p>
+          <a:p>
+            <a:r>
+              <a:rPr lang="nl-BE" dirty="0"/>
+              <a:t>Kleine fout op </a:t>
+            </a:r>
+            <a:r>
+              <a:rPr lang="nl-BE" dirty="0" err="1"/>
+              <a:t>trainingsset</a:t>
+            </a:r>
+            <a:r>
+              <a:rPr lang="nl-BE" dirty="0"/>
+              <a:t> ≠ goede generalisatie</a:t>
+            </a:r>
+          </a:p>
+          <a:p>
+            <a:pPr marL="0" indent="0">
+              <a:buNone/>
+            </a:pPr>
+            <a:r>
+              <a:rPr lang="nl-BE" dirty="0"/>
+              <a:t>Voorbeeld:</a:t>
+            </a:r>
+          </a:p>
+        </p:txBody>
+      </p:sp>
+      <p:sp>
+        <p:nvSpPr>
+          <p:cNvPr id="3" name="Tijdelijke aanduiding voor voettekst 2">
+            <a:extLst>
+              <a:ext uri="{FF2B5EF4-FFF2-40B4-BE49-F238E27FC236}">
+                <a16:creationId xmlns:a16="http://schemas.microsoft.com/office/drawing/2014/main" id="{E8A64DED-D2C6-4420-BC5B-2AC9205393A1}"/>
+              </a:ext>
+            </a:extLst>
+          </p:cNvPr>
+          <p:cNvSpPr>
+            <a:spLocks noGrp="1"/>
+          </p:cNvSpPr>
+          <p:nvPr>
+            <p:ph type="ftr" sz="quarter" idx="11"/>
+          </p:nvPr>
+        </p:nvSpPr>
+        <p:spPr/>
+        <p:txBody>
+          <a:bodyPr/>
+          <a:lstStyle/>
+          <a:p>
+            <a:r>
+              <a:rPr lang="nl-NL"/>
+              <a:t>Faculteit wetenschappen</a:t>
+            </a:r>
+          </a:p>
+        </p:txBody>
+      </p:sp>
+      <p:sp>
+        <p:nvSpPr>
+          <p:cNvPr id="4" name="Tijdelijke aanduiding voor dianummer 3">
+            <a:extLst>
+              <a:ext uri="{FF2B5EF4-FFF2-40B4-BE49-F238E27FC236}">
+                <a16:creationId xmlns:a16="http://schemas.microsoft.com/office/drawing/2014/main" id="{7F0A9854-7366-4EB1-A83C-310994DA9FAD}"/>
+              </a:ext>
+            </a:extLst>
+          </p:cNvPr>
+          <p:cNvSpPr>
+            <a:spLocks noGrp="1"/>
+          </p:cNvSpPr>
+          <p:nvPr>
+            <p:ph type="sldNum" sz="quarter" idx="12"/>
+          </p:nvPr>
+        </p:nvSpPr>
+        <p:spPr/>
+        <p:txBody>
+          <a:bodyPr/>
+          <a:lstStyle/>
+          <a:p>
+            <a:fld id="{0A297500-7527-634B-90F4-69D0994C32B4}" type="slidenum">
+              <a:rPr lang="nl-NL" smtClean="0"/>
+              <a:t>11</a:t>
             </a:fld>
             <a:endParaRPr lang="nl-NL"/>
           </a:p>
@@ -5458,7 +5714,7 @@
 </p:sld>
 </file>
 
-<file path=ppt/slides/slide11.xml><?xml version="1.0" encoding="utf-8"?>
+<file path=ppt/slides/slide12.xml><?xml version="1.0" encoding="utf-8"?>
 <p:sld xmlns:a="http://schemas.openxmlformats.org/drawingml/2006/main" xmlns:r="http://schemas.openxmlformats.org/officeDocument/2006/relationships" xmlns:p="http://schemas.openxmlformats.org/presentationml/2006/main">
   <p:cSld>
     <p:spTree>
@@ -5624,7 +5880,7 @@
           <a:p>
             <a:fld id="{0A297500-7527-634B-90F4-69D0994C32B4}" type="slidenum">
               <a:rPr lang="nl-NL" smtClean="0"/>
-              <a:t>11</a:t>
+              <a:t>12</a:t>
             </a:fld>
             <a:endParaRPr lang="nl-NL"/>
           </a:p>
@@ -5740,7 +5996,7 @@
 </p:sld>
 </file>
 
-<file path=ppt/slides/slide12.xml><?xml version="1.0" encoding="utf-8"?>
+<file path=ppt/slides/slide13.xml><?xml version="1.0" encoding="utf-8"?>
 <p:sld xmlns:a="http://schemas.openxmlformats.org/drawingml/2006/main" xmlns:r="http://schemas.openxmlformats.org/officeDocument/2006/relationships" xmlns:p="http://schemas.openxmlformats.org/presentationml/2006/main">
   <p:cSld>
     <p:spTree>
@@ -6078,7 +6334,7 @@
           <a:p>
             <a:fld id="{0A297500-7527-634B-90F4-69D0994C32B4}" type="slidenum">
               <a:rPr lang="nl-NL" smtClean="0"/>
-              <a:t>12</a:t>
+              <a:t>13</a:t>
             </a:fld>
             <a:endParaRPr lang="nl-NL"/>
           </a:p>
@@ -6224,7 +6480,7 @@
 </p:sld>
 </file>
 
-<file path=ppt/slides/slide13.xml><?xml version="1.0" encoding="utf-8"?>
+<file path=ppt/slides/slide14.xml><?xml version="1.0" encoding="utf-8"?>
 <p:sld xmlns:a="http://schemas.openxmlformats.org/drawingml/2006/main" xmlns:r="http://schemas.openxmlformats.org/officeDocument/2006/relationships" xmlns:p="http://schemas.openxmlformats.org/presentationml/2006/main">
   <p:cSld>
     <p:spTree>
@@ -6480,7 +6736,7 @@
           <a:p>
             <a:fld id="{0A297500-7527-634B-90F4-69D0994C32B4}" type="slidenum">
               <a:rPr lang="nl-NL" smtClean="0"/>
-              <a:t>13</a:t>
+              <a:t>14</a:t>
             </a:fld>
             <a:endParaRPr lang="nl-NL"/>
           </a:p>
@@ -6672,7 +6928,7 @@
 </p:sld>
 </file>
 
-<file path=ppt/slides/slide14.xml><?xml version="1.0" encoding="utf-8"?>
+<file path=ppt/slides/slide15.xml><?xml version="1.0" encoding="utf-8"?>
 <p:sld xmlns:a="http://schemas.openxmlformats.org/drawingml/2006/main" xmlns:r="http://schemas.openxmlformats.org/officeDocument/2006/relationships" xmlns:p="http://schemas.openxmlformats.org/presentationml/2006/main">
   <p:cSld>
     <p:spTree>
@@ -6780,7 +7036,7 @@
           <a:p>
             <a:fld id="{0A297500-7527-634B-90F4-69D0994C32B4}" type="slidenum">
               <a:rPr lang="nl-NL" smtClean="0"/>
-              <a:t>14</a:t>
+              <a:t>15</a:t>
             </a:fld>
             <a:endParaRPr lang="nl-NL"/>
           </a:p>
@@ -6857,7 +7113,7 @@
 </p:sld>
 </file>
 
-<file path=ppt/slides/slide15.xml><?xml version="1.0" encoding="utf-8"?>
+<file path=ppt/slides/slide16.xml><?xml version="1.0" encoding="utf-8"?>
 <p:sld xmlns:a="http://schemas.openxmlformats.org/drawingml/2006/main" xmlns:r="http://schemas.openxmlformats.org/officeDocument/2006/relationships" xmlns:p="http://schemas.openxmlformats.org/presentationml/2006/main">
   <p:cSld>
     <p:spTree>
@@ -7380,7 +7636,7 @@
           <a:p>
             <a:fld id="{0A297500-7527-634B-90F4-69D0994C32B4}" type="slidenum">
               <a:rPr lang="nl-NL" smtClean="0"/>
-              <a:t>15</a:t>
+              <a:t>16</a:t>
             </a:fld>
             <a:endParaRPr lang="nl-NL" dirty="0"/>
           </a:p>
@@ -7545,7 +7801,7 @@
 </p:sld>
 </file>
 
-<file path=ppt/slides/slide16.xml><?xml version="1.0" encoding="utf-8"?>
+<file path=ppt/slides/slide17.xml><?xml version="1.0" encoding="utf-8"?>
 <p:sld xmlns:a="http://schemas.openxmlformats.org/drawingml/2006/main" xmlns:r="http://schemas.openxmlformats.org/officeDocument/2006/relationships" xmlns:p="http://schemas.openxmlformats.org/presentationml/2006/main">
   <p:cSld>
     <p:spTree>
@@ -7658,7 +7914,7 @@
           <a:p>
             <a:fld id="{0A297500-7527-634B-90F4-69D0994C32B4}" type="slidenum">
               <a:rPr lang="nl-NL" smtClean="0"/>
-              <a:t>16</a:t>
+              <a:t>17</a:t>
             </a:fld>
             <a:endParaRPr lang="nl-NL"/>
           </a:p>
@@ -7771,66 +8027,6 @@
 </p:sld>
 </file>
 
-<file path=ppt/slides/slide17.xml><?xml version="1.0" encoding="utf-8"?>
-<p:sld xmlns:a="http://schemas.openxmlformats.org/drawingml/2006/main" xmlns:r="http://schemas.openxmlformats.org/officeDocument/2006/relationships" xmlns:p="http://schemas.openxmlformats.org/presentationml/2006/main">
-  <p:cSld>
-    <p:spTree>
-      <p:nvGrpSpPr>
-        <p:cNvPr id="1" name=""/>
-        <p:cNvGrpSpPr/>
-        <p:nvPr/>
-      </p:nvGrpSpPr>
-      <p:grpSpPr>
-        <a:xfrm>
-          <a:off x="0" y="0"/>
-          <a:ext cx="0" cy="0"/>
-          <a:chOff x="0" y="0"/>
-          <a:chExt cx="0" cy="0"/>
-        </a:xfrm>
-      </p:grpSpPr>
-      <p:sp>
-        <p:nvSpPr>
-          <p:cNvPr id="8" name="Titel 7"/>
-          <p:cNvSpPr>
-            <a:spLocks noGrp="1"/>
-          </p:cNvSpPr>
-          <p:nvPr>
-            <p:ph type="ctrTitle"/>
-          </p:nvPr>
-        </p:nvSpPr>
-        <p:spPr>
-          <a:xfrm>
-            <a:off x="575998" y="1080000"/>
-            <a:ext cx="10299148" cy="4024798"/>
-          </a:xfrm>
-        </p:spPr>
-        <p:txBody>
-          <a:bodyPr>
-            <a:normAutofit/>
-          </a:bodyPr>
-          <a:lstStyle/>
-          <a:p>
-            <a:pPr algn="ctr"/>
-            <a:r>
-              <a:rPr lang="nl-NL" sz="8000" dirty="0"/>
-              <a:t>Vragen?</a:t>
-            </a:r>
-          </a:p>
-        </p:txBody>
-      </p:sp>
-    </p:spTree>
-    <p:extLst>
-      <p:ext uri="{BB962C8B-B14F-4D97-AF65-F5344CB8AC3E}">
-        <p14:creationId xmlns:p14="http://schemas.microsoft.com/office/powerpoint/2010/main" val="2576386695"/>
-      </p:ext>
-    </p:extLst>
-  </p:cSld>
-  <p:clrMapOvr>
-    <a:masterClrMapping/>
-  </p:clrMapOvr>
-</p:sld>
-</file>
-
 <file path=ppt/slides/slide18.xml><?xml version="1.0" encoding="utf-8"?>
 <p:sld xmlns:a="http://schemas.openxmlformats.org/drawingml/2006/main" xmlns:r="http://schemas.openxmlformats.org/officeDocument/2006/relationships" xmlns:p="http://schemas.openxmlformats.org/presentationml/2006/main">
   <p:cSld>
@@ -7850,6 +8046,66 @@
       </p:grpSpPr>
       <p:sp>
         <p:nvSpPr>
+          <p:cNvPr id="8" name="Titel 7"/>
+          <p:cNvSpPr>
+            <a:spLocks noGrp="1"/>
+          </p:cNvSpPr>
+          <p:nvPr>
+            <p:ph type="ctrTitle"/>
+          </p:nvPr>
+        </p:nvSpPr>
+        <p:spPr>
+          <a:xfrm>
+            <a:off x="575998" y="1080000"/>
+            <a:ext cx="10299148" cy="4024798"/>
+          </a:xfrm>
+        </p:spPr>
+        <p:txBody>
+          <a:bodyPr>
+            <a:normAutofit/>
+          </a:bodyPr>
+          <a:lstStyle/>
+          <a:p>
+            <a:pPr algn="ctr"/>
+            <a:r>
+              <a:rPr lang="nl-NL" sz="8000" dirty="0"/>
+              <a:t>Vragen?</a:t>
+            </a:r>
+          </a:p>
+        </p:txBody>
+      </p:sp>
+    </p:spTree>
+    <p:extLst>
+      <p:ext uri="{BB962C8B-B14F-4D97-AF65-F5344CB8AC3E}">
+        <p14:creationId xmlns:p14="http://schemas.microsoft.com/office/powerpoint/2010/main" val="2576386695"/>
+      </p:ext>
+    </p:extLst>
+  </p:cSld>
+  <p:clrMapOvr>
+    <a:masterClrMapping/>
+  </p:clrMapOvr>
+</p:sld>
+</file>
+
+<file path=ppt/slides/slide19.xml><?xml version="1.0" encoding="utf-8"?>
+<p:sld xmlns:a="http://schemas.openxmlformats.org/drawingml/2006/main" xmlns:r="http://schemas.openxmlformats.org/officeDocument/2006/relationships" xmlns:p="http://schemas.openxmlformats.org/presentationml/2006/main">
+  <p:cSld>
+    <p:spTree>
+      <p:nvGrpSpPr>
+        <p:cNvPr id="1" name=""/>
+        <p:cNvGrpSpPr/>
+        <p:nvPr/>
+      </p:nvGrpSpPr>
+      <p:grpSpPr>
+        <a:xfrm>
+          <a:off x="0" y="0"/>
+          <a:ext cx="0" cy="0"/>
+          <a:chOff x="0" y="0"/>
+          <a:chExt cx="0" cy="0"/>
+        </a:xfrm>
+      </p:grpSpPr>
+      <p:sp>
+        <p:nvSpPr>
           <p:cNvPr id="2" name="Tijdelijke aanduiding voor inhoud 1">
             <a:extLst>
               <a:ext uri="{FF2B5EF4-FFF2-40B4-BE49-F238E27FC236}">
@@ -8233,7 +8489,7 @@
           <a:p>
             <a:fld id="{0A297500-7527-634B-90F4-69D0994C32B4}" type="slidenum">
               <a:rPr lang="nl-NL" smtClean="0"/>
-              <a:t>18</a:t>
+              <a:t>19</a:t>
             </a:fld>
             <a:endParaRPr lang="nl-NL"/>
           </a:p>
@@ -10230,35 +10486,6 @@
           </a:prstGeom>
         </p:spPr>
       </p:pic>
-      <p:pic>
-        <p:nvPicPr>
-          <p:cNvPr id="25" name="Picture 24" descr="Diagram&#10;&#10;Description automatically generated">
-            <a:extLst>
-              <a:ext uri="{FF2B5EF4-FFF2-40B4-BE49-F238E27FC236}">
-                <a16:creationId xmlns:a16="http://schemas.microsoft.com/office/drawing/2014/main" id="{E1E17FDB-4C05-4256-BEBD-98192EE1F9C3}"/>
-              </a:ext>
-            </a:extLst>
-          </p:cNvPr>
-          <p:cNvPicPr>
-            <a:picLocks noChangeAspect="1"/>
-          </p:cNvPicPr>
-          <p:nvPr/>
-        </p:nvPicPr>
-        <p:blipFill rotWithShape="1">
-          <a:blip r:embed="rId3"/>
-          <a:srcRect b="5498"/>
-          <a:stretch/>
-        </p:blipFill>
-        <p:spPr>
-          <a:xfrm>
-            <a:off x="0" y="0"/>
-            <a:ext cx="12192000" cy="6181703"/>
-          </a:xfrm>
-          <a:prstGeom prst="rect">
-            <a:avLst/>
-          </a:prstGeom>
-        </p:spPr>
-      </p:pic>
     </p:spTree>
     <p:extLst>
       <p:ext uri="{BB962C8B-B14F-4D97-AF65-F5344CB8AC3E}">
@@ -10269,108 +10496,6 @@
   <p:clrMapOvr>
     <a:masterClrMapping/>
   </p:clrMapOvr>
-  <p:timing>
-    <p:tnLst>
-      <p:par>
-        <p:cTn id="1" dur="indefinite" restart="never" nodeType="tmRoot">
-          <p:childTnLst>
-            <p:seq concurrent="1" nextAc="seek">
-              <p:cTn id="2" dur="indefinite" nodeType="mainSeq">
-                <p:childTnLst>
-                  <p:par>
-                    <p:cTn id="3" fill="hold">
-                      <p:stCondLst>
-                        <p:cond delay="indefinite"/>
-                      </p:stCondLst>
-                      <p:childTnLst>
-                        <p:par>
-                          <p:cTn id="4" fill="hold">
-                            <p:stCondLst>
-                              <p:cond delay="0"/>
-                            </p:stCondLst>
-                            <p:childTnLst>
-                              <p:par>
-                                <p:cTn id="5" presetID="1" presetClass="entr" presetSubtype="0" fill="hold" nodeType="clickEffect">
-                                  <p:stCondLst>
-                                    <p:cond delay="0"/>
-                                  </p:stCondLst>
-                                  <p:childTnLst>
-                                    <p:set>
-                                      <p:cBhvr>
-                                        <p:cTn id="6" dur="1" fill="hold">
-                                          <p:stCondLst>
-                                            <p:cond delay="0"/>
-                                          </p:stCondLst>
-                                        </p:cTn>
-                                        <p:tgtEl>
-                                          <p:spTgt spid="25"/>
-                                        </p:tgtEl>
-                                        <p:attrNameLst>
-                                          <p:attrName>style.visibility</p:attrName>
-                                        </p:attrNameLst>
-                                      </p:cBhvr>
-                                      <p:to>
-                                        <p:strVal val="visible"/>
-                                      </p:to>
-                                    </p:set>
-                                  </p:childTnLst>
-                                </p:cTn>
-                              </p:par>
-                              <p:par>
-                                <p:cTn id="7" presetID="1" presetClass="exit" presetSubtype="0" fill="hold" nodeType="withEffect">
-                                  <p:stCondLst>
-                                    <p:cond delay="0"/>
-                                  </p:stCondLst>
-                                  <p:childTnLst>
-                                    <p:set>
-                                      <p:cBhvr>
-                                        <p:cTn id="8" dur="1" fill="hold">
-                                          <p:stCondLst>
-                                            <p:cond delay="0"/>
-                                          </p:stCondLst>
-                                        </p:cTn>
-                                        <p:tgtEl>
-                                          <p:spTgt spid="27"/>
-                                        </p:tgtEl>
-                                        <p:attrNameLst>
-                                          <p:attrName>style.visibility</p:attrName>
-                                        </p:attrNameLst>
-                                      </p:cBhvr>
-                                      <p:to>
-                                        <p:strVal val="hidden"/>
-                                      </p:to>
-                                    </p:set>
-                                  </p:childTnLst>
-                                </p:cTn>
-                              </p:par>
-                            </p:childTnLst>
-                          </p:cTn>
-                        </p:par>
-                      </p:childTnLst>
-                    </p:cTn>
-                  </p:par>
-                </p:childTnLst>
-              </p:cTn>
-              <p:prevCondLst>
-                <p:cond evt="onPrev" delay="0">
-                  <p:tgtEl>
-                    <p:sldTgt/>
-                  </p:tgtEl>
-                </p:cond>
-              </p:prevCondLst>
-              <p:nextCondLst>
-                <p:cond evt="onNext" delay="0">
-                  <p:tgtEl>
-                    <p:sldTgt/>
-                  </p:tgtEl>
-                </p:cond>
-              </p:nextCondLst>
-            </p:seq>
-          </p:childTnLst>
-        </p:cTn>
-      </p:par>
-    </p:tnLst>
-  </p:timing>
 </p:sld>
 </file>
 
@@ -10391,8 +10516,242 @@
           <a:chExt cx="0" cy="0"/>
         </a:xfrm>
       </p:grpSpPr>
-      <mc:AlternateContent xmlns:mc="http://schemas.openxmlformats.org/markup-compatibility/2006">
-        <mc:Choice xmlns:a14="http://schemas.microsoft.com/office/drawing/2010/main" Requires="a14">
+      <p:sp>
+        <p:nvSpPr>
+          <p:cNvPr id="3" name="Footer Placeholder 2">
+            <a:extLst>
+              <a:ext uri="{FF2B5EF4-FFF2-40B4-BE49-F238E27FC236}">
+                <a16:creationId xmlns:a16="http://schemas.microsoft.com/office/drawing/2014/main" id="{8BCC9FB4-3EFE-43EE-81C9-3E64DB3B51E5}"/>
+              </a:ext>
+            </a:extLst>
+          </p:cNvPr>
+          <p:cNvSpPr>
+            <a:spLocks noGrp="1"/>
+          </p:cNvSpPr>
+          <p:nvPr>
+            <p:ph type="ftr" sz="quarter" idx="11"/>
+          </p:nvPr>
+        </p:nvSpPr>
+        <p:spPr/>
+        <p:txBody>
+          <a:bodyPr/>
+          <a:lstStyle/>
+          <a:p>
+            <a:r>
+              <a:rPr lang="nl-NL"/>
+              <a:t>Faculteit wetenschappen</a:t>
+            </a:r>
+          </a:p>
+        </p:txBody>
+      </p:sp>
+      <p:sp>
+        <p:nvSpPr>
+          <p:cNvPr id="4" name="Slide Number Placeholder 3">
+            <a:extLst>
+              <a:ext uri="{FF2B5EF4-FFF2-40B4-BE49-F238E27FC236}">
+                <a16:creationId xmlns:a16="http://schemas.microsoft.com/office/drawing/2014/main" id="{0D6B5CDE-F600-4A6A-A3BC-05806696DEEB}"/>
+              </a:ext>
+            </a:extLst>
+          </p:cNvPr>
+          <p:cNvSpPr>
+            <a:spLocks noGrp="1"/>
+          </p:cNvSpPr>
+          <p:nvPr>
+            <p:ph type="sldNum" sz="quarter" idx="12"/>
+          </p:nvPr>
+        </p:nvSpPr>
+        <p:spPr/>
+        <p:txBody>
+          <a:bodyPr/>
+          <a:lstStyle/>
+          <a:p>
+            <a:fld id="{0A297500-7527-634B-90F4-69D0994C32B4}" type="slidenum">
+              <a:rPr lang="nl-NL" smtClean="0"/>
+              <a:t>5</a:t>
+            </a:fld>
+            <a:endParaRPr lang="nl-NL"/>
+          </a:p>
+        </p:txBody>
+      </p:sp>
+      <p:sp>
+        <p:nvSpPr>
+          <p:cNvPr id="5" name="Title 4">
+            <a:extLst>
+              <a:ext uri="{FF2B5EF4-FFF2-40B4-BE49-F238E27FC236}">
+                <a16:creationId xmlns:a16="http://schemas.microsoft.com/office/drawing/2014/main" id="{0CC819A1-CA0A-4472-9A13-4160F3E74B92}"/>
+              </a:ext>
+            </a:extLst>
+          </p:cNvPr>
+          <p:cNvSpPr>
+            <a:spLocks noGrp="1"/>
+          </p:cNvSpPr>
+          <p:nvPr>
+            <p:ph type="title"/>
+          </p:nvPr>
+        </p:nvSpPr>
+        <p:spPr>
+          <a:xfrm>
+            <a:off x="5442856" y="207036"/>
+            <a:ext cx="6174343" cy="1152000"/>
+          </a:xfrm>
+        </p:spPr>
+        <p:txBody>
+          <a:bodyPr/>
+          <a:lstStyle/>
+          <a:p>
+            <a:endParaRPr lang="en-GB" dirty="0"/>
+          </a:p>
+        </p:txBody>
+      </p:sp>
+      <p:sp>
+        <p:nvSpPr>
+          <p:cNvPr id="11" name="Content Placeholder 10">
+            <a:extLst>
+              <a:ext uri="{FF2B5EF4-FFF2-40B4-BE49-F238E27FC236}">
+                <a16:creationId xmlns:a16="http://schemas.microsoft.com/office/drawing/2014/main" id="{764493C5-CA00-4BE3-8A52-A57220C83572}"/>
+              </a:ext>
+            </a:extLst>
+          </p:cNvPr>
+          <p:cNvSpPr>
+            <a:spLocks noGrp="1"/>
+          </p:cNvSpPr>
+          <p:nvPr>
+            <p:ph idx="1"/>
+          </p:nvPr>
+        </p:nvSpPr>
+        <p:spPr>
+          <a:xfrm>
+            <a:off x="665571" y="883250"/>
+            <a:ext cx="11041200" cy="5686400"/>
+          </a:xfrm>
+        </p:spPr>
+        <p:txBody>
+          <a:bodyPr/>
+          <a:lstStyle/>
+          <a:p>
+            <a:r>
+              <a:rPr lang="en-GB" dirty="0"/>
+              <a:t>Input vector: x</a:t>
+            </a:r>
+          </a:p>
+          <a:p>
+            <a:r>
+              <a:rPr lang="en-GB" dirty="0" err="1"/>
+              <a:t>Gewichtsmatrix</a:t>
+            </a:r>
+            <a:r>
+              <a:rPr lang="en-GB" dirty="0"/>
+              <a:t>: W</a:t>
+            </a:r>
+          </a:p>
+          <a:p>
+            <a:r>
+              <a:rPr lang="en-GB" dirty="0"/>
+              <a:t>Bias vector: b</a:t>
+            </a:r>
+          </a:p>
+          <a:p>
+            <a:r>
+              <a:rPr lang="en-GB" dirty="0" err="1"/>
+              <a:t>Niet-lineaire</a:t>
+            </a:r>
+            <a:r>
+              <a:rPr lang="en-GB" dirty="0"/>
+              <a:t> transf. : f(x)</a:t>
+            </a:r>
+          </a:p>
+          <a:p>
+            <a:r>
+              <a:rPr lang="en-GB" dirty="0"/>
+              <a:t>Output </a:t>
+            </a:r>
+            <a:r>
+              <a:rPr lang="en-GB" dirty="0" err="1"/>
+              <a:t>netwerk</a:t>
+            </a:r>
+            <a:r>
+              <a:rPr lang="en-GB" dirty="0"/>
+              <a:t>: F(x)</a:t>
+            </a:r>
+          </a:p>
+          <a:p>
+            <a:endParaRPr lang="en-GB" dirty="0"/>
+          </a:p>
+          <a:p>
+            <a:endParaRPr lang="en-GB" dirty="0"/>
+          </a:p>
+          <a:p>
+            <a:endParaRPr lang="en-GB" dirty="0"/>
+          </a:p>
+          <a:p>
+            <a:endParaRPr lang="en-GB" dirty="0"/>
+          </a:p>
+          <a:p>
+            <a:endParaRPr lang="en-GB" dirty="0"/>
+          </a:p>
+        </p:txBody>
+      </p:sp>
+      <p:pic>
+        <p:nvPicPr>
+          <p:cNvPr id="25" name="Picture 24" descr="Diagram&#10;&#10;Description automatically generated">
+            <a:extLst>
+              <a:ext uri="{FF2B5EF4-FFF2-40B4-BE49-F238E27FC236}">
+                <a16:creationId xmlns:a16="http://schemas.microsoft.com/office/drawing/2014/main" id="{E1E17FDB-4C05-4256-BEBD-98192EE1F9C3}"/>
+              </a:ext>
+            </a:extLst>
+          </p:cNvPr>
+          <p:cNvPicPr>
+            <a:picLocks noChangeAspect="1"/>
+          </p:cNvPicPr>
+          <p:nvPr/>
+        </p:nvPicPr>
+        <p:blipFill rotWithShape="1">
+          <a:blip r:embed="rId2"/>
+          <a:srcRect b="5498"/>
+          <a:stretch/>
+        </p:blipFill>
+        <p:spPr>
+          <a:xfrm>
+            <a:off x="0" y="0"/>
+            <a:ext cx="12192000" cy="6181703"/>
+          </a:xfrm>
+          <a:prstGeom prst="rect">
+            <a:avLst/>
+          </a:prstGeom>
+        </p:spPr>
+      </p:pic>
+    </p:spTree>
+    <p:extLst>
+      <p:ext uri="{BB962C8B-B14F-4D97-AF65-F5344CB8AC3E}">
+        <p14:creationId xmlns:p14="http://schemas.microsoft.com/office/powerpoint/2010/main" val="2095616229"/>
+      </p:ext>
+    </p:extLst>
+  </p:cSld>
+  <p:clrMapOvr>
+    <a:masterClrMapping/>
+  </p:clrMapOvr>
+</p:sld>
+</file>
+
+<file path=ppt/slides/slide6.xml><?xml version="1.0" encoding="utf-8"?>
+<p:sld xmlns:a="http://schemas.openxmlformats.org/drawingml/2006/main" xmlns:r="http://schemas.openxmlformats.org/officeDocument/2006/relationships" xmlns:p="http://schemas.openxmlformats.org/presentationml/2006/main">
+  <p:cSld>
+    <p:spTree>
+      <p:nvGrpSpPr>
+        <p:cNvPr id="1" name=""/>
+        <p:cNvGrpSpPr/>
+        <p:nvPr/>
+      </p:nvGrpSpPr>
+      <p:grpSpPr>
+        <a:xfrm>
+          <a:off x="0" y="0"/>
+          <a:ext cx="0" cy="0"/>
+          <a:chOff x="0" y="0"/>
+          <a:chExt cx="0" cy="0"/>
+        </a:xfrm>
+      </p:grpSpPr>
+      <mc:AlternateContent xmlns:mc="http://schemas.openxmlformats.org/markup-compatibility/2006" xmlns:a14="http://schemas.microsoft.com/office/drawing/2010/main">
+        <mc:Choice Requires="a14">
           <p:sp>
             <p:nvSpPr>
               <p:cNvPr id="2" name="Tijdelijke aanduiding voor inhoud 1">
@@ -10601,7 +10960,7 @@
             </p:txBody>
           </p:sp>
         </mc:Choice>
-        <mc:Fallback>
+        <mc:Fallback xmlns="">
           <p:sp>
             <p:nvSpPr>
               <p:cNvPr id="2" name="Tijdelijke aanduiding voor inhoud 1">
@@ -10696,7 +11055,7 @@
           <a:p>
             <a:fld id="{0A297500-7527-634B-90F4-69D0994C32B4}" type="slidenum">
               <a:rPr lang="nl-NL" smtClean="0"/>
-              <a:t>5</a:t>
+              <a:t>6</a:t>
             </a:fld>
             <a:endParaRPr lang="nl-NL"/>
           </a:p>
@@ -10795,7 +11154,7 @@
 </p:sld>
 </file>
 
-<file path=ppt/slides/slide6.xml><?xml version="1.0" encoding="utf-8"?>
+<file path=ppt/slides/slide7.xml><?xml version="1.0" encoding="utf-8"?>
 <p:sld xmlns:a="http://schemas.openxmlformats.org/drawingml/2006/main" xmlns:r="http://schemas.openxmlformats.org/officeDocument/2006/relationships" xmlns:p="http://schemas.openxmlformats.org/presentationml/2006/main">
   <p:cSld>
     <p:spTree>
@@ -10812,8 +11171,8 @@
           <a:chExt cx="0" cy="0"/>
         </a:xfrm>
       </p:grpSpPr>
-      <mc:AlternateContent xmlns:mc="http://schemas.openxmlformats.org/markup-compatibility/2006">
-        <mc:Choice xmlns:a14="http://schemas.microsoft.com/office/drawing/2010/main" Requires="a14">
+      <mc:AlternateContent xmlns:mc="http://schemas.openxmlformats.org/markup-compatibility/2006" xmlns:a14="http://schemas.microsoft.com/office/drawing/2010/main">
+        <mc:Choice Requires="a14">
           <p:sp>
             <p:nvSpPr>
               <p:cNvPr id="2" name="Tijdelijke aanduiding voor inhoud 1">
@@ -11110,7 +11469,7 @@
             </p:txBody>
           </p:sp>
         </mc:Choice>
-        <mc:Fallback>
+        <mc:Fallback xmlns="">
           <p:sp>
             <p:nvSpPr>
               <p:cNvPr id="2" name="Tijdelijke aanduiding voor inhoud 1">
@@ -11205,7 +11564,7 @@
           <a:p>
             <a:fld id="{0A297500-7527-634B-90F4-69D0994C32B4}" type="slidenum">
               <a:rPr lang="nl-NL" smtClean="0"/>
-              <a:t>6</a:t>
+              <a:t>7</a:t>
             </a:fld>
             <a:endParaRPr lang="nl-NL"/>
           </a:p>
@@ -11306,7 +11665,7 @@
 </p:sld>
 </file>
 
-<file path=ppt/slides/slide7.xml><?xml version="1.0" encoding="utf-8"?>
+<file path=ppt/slides/slide8.xml><?xml version="1.0" encoding="utf-8"?>
 <p:sld xmlns:a="http://schemas.openxmlformats.org/drawingml/2006/main" xmlns:r="http://schemas.openxmlformats.org/officeDocument/2006/relationships" xmlns:p="http://schemas.openxmlformats.org/presentationml/2006/main">
   <p:cSld>
     <p:spTree>
@@ -11402,7 +11761,7 @@
           <a:p>
             <a:fld id="{0A297500-7527-634B-90F4-69D0994C32B4}" type="slidenum">
               <a:rPr lang="nl-NL" smtClean="0"/>
-              <a:t>7</a:t>
+              <a:t>8</a:t>
             </a:fld>
             <a:endParaRPr lang="nl-NL"/>
           </a:p>
@@ -11783,7 +12142,7 @@
 </p:sld>
 </file>
 
-<file path=ppt/slides/slide8.xml><?xml version="1.0" encoding="utf-8"?>
+<file path=ppt/slides/slide9.xml><?xml version="1.0" encoding="utf-8"?>
 <p:sld xmlns:a="http://schemas.openxmlformats.org/drawingml/2006/main" xmlns:r="http://schemas.openxmlformats.org/officeDocument/2006/relationships" xmlns:p="http://schemas.openxmlformats.org/presentationml/2006/main">
   <p:cSld>
     <p:spTree>
@@ -12078,7 +12437,7 @@
           <a:p>
             <a:fld id="{0A297500-7527-634B-90F4-69D0994C32B4}" type="slidenum">
               <a:rPr lang="nl-NL" smtClean="0"/>
-              <a:t>8</a:t>
+              <a:t>9</a:t>
             </a:fld>
             <a:endParaRPr lang="nl-NL"/>
           </a:p>
@@ -12269,261 +12628,6 @@
     <p:extLst>
       <p:ext uri="{BB962C8B-B14F-4D97-AF65-F5344CB8AC3E}">
         <p14:creationId xmlns:p14="http://schemas.microsoft.com/office/powerpoint/2010/main" val="649465542"/>
-      </p:ext>
-    </p:extLst>
-  </p:cSld>
-  <p:clrMapOvr>
-    <a:masterClrMapping/>
-  </p:clrMapOvr>
-</p:sld>
-</file>
-
-<file path=ppt/slides/slide9.xml><?xml version="1.0" encoding="utf-8"?>
-<p:sld xmlns:a="http://schemas.openxmlformats.org/drawingml/2006/main" xmlns:r="http://schemas.openxmlformats.org/officeDocument/2006/relationships" xmlns:p="http://schemas.openxmlformats.org/presentationml/2006/main">
-  <p:cSld>
-    <p:spTree>
-      <p:nvGrpSpPr>
-        <p:cNvPr id="1" name=""/>
-        <p:cNvGrpSpPr/>
-        <p:nvPr/>
-      </p:nvGrpSpPr>
-      <p:grpSpPr>
-        <a:xfrm>
-          <a:off x="0" y="0"/>
-          <a:ext cx="0" cy="0"/>
-          <a:chOff x="0" y="0"/>
-          <a:chExt cx="0" cy="0"/>
-        </a:xfrm>
-      </p:grpSpPr>
-      <p:sp>
-        <p:nvSpPr>
-          <p:cNvPr id="2" name="Tijdelijke aanduiding voor inhoud 1">
-            <a:extLst>
-              <a:ext uri="{FF2B5EF4-FFF2-40B4-BE49-F238E27FC236}">
-                <a16:creationId xmlns:a16="http://schemas.microsoft.com/office/drawing/2014/main" id="{C79333D8-4E56-48D2-8BC5-D836CD92E7F5}"/>
-              </a:ext>
-            </a:extLst>
-          </p:cNvPr>
-          <p:cNvSpPr>
-            <a:spLocks noGrp="1"/>
-          </p:cNvSpPr>
-          <p:nvPr>
-            <p:ph idx="1"/>
-          </p:nvPr>
-        </p:nvSpPr>
-        <p:spPr/>
-        <p:txBody>
-          <a:bodyPr/>
-          <a:lstStyle/>
-          <a:p>
-            <a:r>
-              <a:rPr lang="nl-BE" dirty="0"/>
-              <a:t>Telkens 1 punt nemen:</a:t>
-            </a:r>
-          </a:p>
-          <a:p>
-            <a:pPr marL="0" indent="0">
-              <a:buNone/>
-            </a:pPr>
-            <a:endParaRPr lang="nl-BE" dirty="0"/>
-          </a:p>
-          <a:p>
-            <a:pPr marL="0" indent="0">
-              <a:buNone/>
-            </a:pPr>
-            <a:endParaRPr lang="nl-BE" dirty="0"/>
-          </a:p>
-          <a:p>
-            <a:r>
-              <a:rPr lang="nl-BE" dirty="0"/>
-              <a:t>Telkens m &lt;&lt; N punten nemen:</a:t>
-            </a:r>
-          </a:p>
-          <a:p>
-            <a:pPr lvl="1"/>
-            <a:r>
-              <a:rPr lang="nl-BE" dirty="0"/>
-              <a:t>Minibatch</a:t>
-            </a:r>
-          </a:p>
-          <a:p>
-            <a:endParaRPr lang="nl-BE" dirty="0"/>
-          </a:p>
-          <a:p>
-            <a:endParaRPr lang="nl-BE" dirty="0"/>
-          </a:p>
-          <a:p>
-            <a:r>
-              <a:rPr lang="nl-BE" dirty="0"/>
-              <a:t>Met/zonder vervanging</a:t>
-            </a:r>
-          </a:p>
-        </p:txBody>
-      </p:sp>
-      <p:sp>
-        <p:nvSpPr>
-          <p:cNvPr id="3" name="Tijdelijke aanduiding voor voettekst 2">
-            <a:extLst>
-              <a:ext uri="{FF2B5EF4-FFF2-40B4-BE49-F238E27FC236}">
-                <a16:creationId xmlns:a16="http://schemas.microsoft.com/office/drawing/2014/main" id="{70CB2AD9-04AF-4EA4-BA1E-3377F6E0748D}"/>
-              </a:ext>
-            </a:extLst>
-          </p:cNvPr>
-          <p:cNvSpPr>
-            <a:spLocks noGrp="1"/>
-          </p:cNvSpPr>
-          <p:nvPr>
-            <p:ph type="ftr" sz="quarter" idx="11"/>
-          </p:nvPr>
-        </p:nvSpPr>
-        <p:spPr/>
-        <p:txBody>
-          <a:bodyPr/>
-          <a:lstStyle/>
-          <a:p>
-            <a:r>
-              <a:rPr lang="nl-NL"/>
-              <a:t>Faculteit wetenschappen</a:t>
-            </a:r>
-          </a:p>
-        </p:txBody>
-      </p:sp>
-      <p:sp>
-        <p:nvSpPr>
-          <p:cNvPr id="4" name="Tijdelijke aanduiding voor dianummer 3">
-            <a:extLst>
-              <a:ext uri="{FF2B5EF4-FFF2-40B4-BE49-F238E27FC236}">
-                <a16:creationId xmlns:a16="http://schemas.microsoft.com/office/drawing/2014/main" id="{86C94A12-C2C6-4355-AAC4-5D2C3F4A327F}"/>
-              </a:ext>
-            </a:extLst>
-          </p:cNvPr>
-          <p:cNvSpPr>
-            <a:spLocks noGrp="1"/>
-          </p:cNvSpPr>
-          <p:nvPr>
-            <p:ph type="sldNum" sz="quarter" idx="12"/>
-          </p:nvPr>
-        </p:nvSpPr>
-        <p:spPr/>
-        <p:txBody>
-          <a:bodyPr/>
-          <a:lstStyle/>
-          <a:p>
-            <a:fld id="{0A297500-7527-634B-90F4-69D0994C32B4}" type="slidenum">
-              <a:rPr lang="nl-NL" smtClean="0"/>
-              <a:t>9</a:t>
-            </a:fld>
-            <a:endParaRPr lang="nl-NL"/>
-          </a:p>
-        </p:txBody>
-      </p:sp>
-      <p:sp>
-        <p:nvSpPr>
-          <p:cNvPr id="5" name="Titel 4">
-            <a:extLst>
-              <a:ext uri="{FF2B5EF4-FFF2-40B4-BE49-F238E27FC236}">
-                <a16:creationId xmlns:a16="http://schemas.microsoft.com/office/drawing/2014/main" id="{8A8BAFB1-02E4-4847-A573-784E02115F7B}"/>
-              </a:ext>
-            </a:extLst>
-          </p:cNvPr>
-          <p:cNvSpPr>
-            <a:spLocks noGrp="1"/>
-          </p:cNvSpPr>
-          <p:nvPr>
-            <p:ph type="title"/>
-          </p:nvPr>
-        </p:nvSpPr>
-        <p:spPr/>
-        <p:txBody>
-          <a:bodyPr/>
-          <a:lstStyle/>
-          <a:p>
-            <a:r>
-              <a:rPr lang="nl-BE" dirty="0" err="1"/>
-              <a:t>Stochastic</a:t>
-            </a:r>
-            <a:r>
-              <a:rPr lang="nl-BE" dirty="0"/>
-              <a:t> </a:t>
-            </a:r>
-            <a:r>
-              <a:rPr lang="nl-BE" dirty="0" err="1"/>
-              <a:t>gradient</a:t>
-            </a:r>
-            <a:r>
-              <a:rPr lang="nl-BE" dirty="0"/>
-              <a:t> </a:t>
-            </a:r>
-            <a:r>
-              <a:rPr lang="nl-BE" dirty="0" err="1"/>
-              <a:t>descent</a:t>
-            </a:r>
-            <a:endParaRPr lang="nl-BE" dirty="0"/>
-          </a:p>
-        </p:txBody>
-      </p:sp>
-      <p:pic>
-        <p:nvPicPr>
-          <p:cNvPr id="7" name="Afbeelding 6" descr="Afbeelding met object, klok&#10;&#10;Automatisch gegenereerde beschrijving">
-            <a:extLst>
-              <a:ext uri="{FF2B5EF4-FFF2-40B4-BE49-F238E27FC236}">
-                <a16:creationId xmlns:a16="http://schemas.microsoft.com/office/drawing/2014/main" id="{1499888D-4D2D-48AA-822E-E73E59823143}"/>
-              </a:ext>
-            </a:extLst>
-          </p:cNvPr>
-          <p:cNvPicPr>
-            <a:picLocks noChangeAspect="1"/>
-          </p:cNvPicPr>
-          <p:nvPr/>
-        </p:nvPicPr>
-        <p:blipFill rotWithShape="1">
-          <a:blip r:embed="rId2"/>
-          <a:srcRect l="3639" t="9482"/>
-          <a:stretch/>
-        </p:blipFill>
-        <p:spPr>
-          <a:xfrm>
-            <a:off x="6598362" y="1566000"/>
-            <a:ext cx="2724381" cy="579439"/>
-          </a:xfrm>
-          <a:prstGeom prst="rect">
-            <a:avLst/>
-          </a:prstGeom>
-        </p:spPr>
-      </p:pic>
-      <p:pic>
-        <p:nvPicPr>
-          <p:cNvPr id="9" name="Afbeelding 8" descr="Afbeelding met object, klok&#10;&#10;Automatisch gegenereerde beschrijving">
-            <a:extLst>
-              <a:ext uri="{FF2B5EF4-FFF2-40B4-BE49-F238E27FC236}">
-                <a16:creationId xmlns:a16="http://schemas.microsoft.com/office/drawing/2014/main" id="{7A770CCF-297A-49CB-A7AB-C9200BD735D8}"/>
-              </a:ext>
-            </a:extLst>
-          </p:cNvPr>
-          <p:cNvPicPr>
-            <a:picLocks noChangeAspect="1"/>
-          </p:cNvPicPr>
-          <p:nvPr/>
-        </p:nvPicPr>
-        <p:blipFill rotWithShape="1">
-          <a:blip r:embed="rId3"/>
-          <a:srcRect l="1913"/>
-          <a:stretch/>
-        </p:blipFill>
-        <p:spPr>
-          <a:xfrm>
-            <a:off x="6598362" y="2813005"/>
-            <a:ext cx="3789774" cy="1005927"/>
-          </a:xfrm>
-          <a:prstGeom prst="rect">
-            <a:avLst/>
-          </a:prstGeom>
-        </p:spPr>
-      </p:pic>
-    </p:spTree>
-    <p:extLst>
-      <p:ext uri="{BB962C8B-B14F-4D97-AF65-F5344CB8AC3E}">
-        <p14:creationId xmlns:p14="http://schemas.microsoft.com/office/powerpoint/2010/main" val="1225278259"/>
       </p:ext>
     </p:extLst>
   </p:cSld>

</xml_diff>